<commit_message>
Change initial state of ProviderProcessor
</commit_message>
<xml_diff>
--- a/legacy.pptx
+++ b/legacy.pptx
@@ -7149,7 +7149,7 @@
           <a:p>
             <a:fld id="{16E5F246-0B7D-44DF-8C1B-EDFCA5DA626A}" type="datetimeFigureOut">
               <a:rPr lang="ru-RU" smtClean="0"/>
-              <a:t>24.09.2017</a:t>
+              <a:t>25.09.2017</a:t>
             </a:fld>
             <a:endParaRPr lang="ru-RU" dirty="0"/>
           </a:p>
@@ -12853,7 +12853,7 @@
               <a:buNone/>
             </a:pPr>
             <a:r>
-              <a:rPr lang="en-US" sz="2000" dirty="0">
+              <a:rPr lang="en-US" sz="1800" dirty="0">
                 <a:solidFill>
                   <a:srgbClr val="0000FF"/>
                 </a:solidFill>
@@ -12862,13 +12862,13 @@
               <a:t>class</a:t>
             </a:r>
             <a:r>
-              <a:rPr lang="en-US" sz="2000" dirty="0">
+              <a:rPr lang="en-US" sz="1800" dirty="0">
                 <a:latin typeface="Consolas" panose="020B0609020204030204" pitchFamily="49" charset="0"/>
               </a:rPr>
               <a:t> </a:t>
             </a:r>
             <a:r>
-              <a:rPr lang="en-US" sz="2000" dirty="0" err="1">
+              <a:rPr lang="en-US" sz="1800" dirty="0" err="1">
                 <a:solidFill>
                   <a:srgbClr val="00007F"/>
                 </a:solidFill>
@@ -12877,13 +12877,13 @@
               <a:t>ProductValidator</a:t>
             </a:r>
             <a:r>
-              <a:rPr lang="ru-RU" sz="2000" dirty="0">
+              <a:rPr lang="ru-RU" sz="1800" dirty="0">
                 <a:latin typeface="Consolas" panose="020B0609020204030204" pitchFamily="49" charset="0"/>
               </a:rPr>
               <a:t> </a:t>
             </a:r>
             <a:r>
-              <a:rPr lang="en-US" sz="2000" dirty="0">
+              <a:rPr lang="en-US" sz="1800" dirty="0">
                 <a:latin typeface="Consolas" panose="020B0609020204030204" pitchFamily="49" charset="0"/>
               </a:rPr>
               <a:t>{</a:t>
@@ -12894,13 +12894,28 @@
               <a:buNone/>
             </a:pPr>
             <a:r>
-              <a:rPr lang="en-US" sz="2000" dirty="0">
+              <a:rPr lang="en-US" sz="1800" dirty="0">
                 <a:latin typeface="Consolas" panose="020B0609020204030204" pitchFamily="49" charset="0"/>
               </a:rPr>
               <a:t>    </a:t>
             </a:r>
             <a:r>
-              <a:rPr lang="en-US" sz="2000" dirty="0" err="1">
+              <a:rPr lang="en-US" sz="1800" dirty="0" err="1">
+                <a:solidFill>
+                  <a:srgbClr val="00007F"/>
+                </a:solidFill>
+                <a:latin typeface="Consolas" panose="020B0609020204030204" pitchFamily="49" charset="0"/>
+              </a:rPr>
+              <a:t>IList</a:t>
+            </a:r>
+            <a:r>
+              <a:rPr lang="en-US" sz="1800" dirty="0">
+                <a:latin typeface="Consolas" panose="020B0609020204030204" pitchFamily="49" charset="0"/>
+              </a:rPr>
+              <a:t>&lt;</a:t>
+            </a:r>
+            <a:r>
+              <a:rPr lang="en-US" sz="1800" dirty="0" err="1">
                 <a:solidFill>
                   <a:srgbClr val="00007F"/>
                 </a:solidFill>
@@ -12909,13 +12924,22 @@
               <a:t>ProductValidationResult</a:t>
             </a:r>
             <a:r>
-              <a:rPr lang="en-US" sz="2000" dirty="0">
+              <a:rPr lang="en-US" sz="1800" dirty="0">
+                <a:solidFill>
+                  <a:srgbClr val="00007F"/>
+                </a:solidFill>
+                <a:latin typeface="Consolas" panose="020B0609020204030204" pitchFamily="49" charset="0"/>
+              </a:rPr>
+              <a:t>&gt;</a:t>
+            </a:r>
+            <a:r>
+              <a:rPr lang="en-US" sz="1800" dirty="0">
                 <a:latin typeface="Consolas" panose="020B0609020204030204" pitchFamily="49" charset="0"/>
               </a:rPr>
               <a:t> </a:t>
             </a:r>
             <a:r>
-              <a:rPr lang="en-US" sz="2000" dirty="0" err="1">
+              <a:rPr lang="en-US" sz="1800" dirty="0" err="1">
                 <a:solidFill>
                   <a:srgbClr val="2B91AF"/>
                 </a:solidFill>
@@ -12924,13 +12948,13 @@
               <a:t>ValidateProduct</a:t>
             </a:r>
             <a:r>
-              <a:rPr lang="en-US" sz="2000" dirty="0">
+              <a:rPr lang="en-US" sz="1800" dirty="0">
                 <a:latin typeface="Consolas" panose="020B0609020204030204" pitchFamily="49" charset="0"/>
               </a:rPr>
               <a:t>(</a:t>
             </a:r>
             <a:r>
-              <a:rPr lang="en-US" sz="2000" dirty="0" err="1">
+              <a:rPr lang="en-US" sz="1800" dirty="0" err="1">
                 <a:solidFill>
                   <a:srgbClr val="00007F"/>
                 </a:solidFill>
@@ -12939,7 +12963,7 @@
               <a:t>ProductData</a:t>
             </a:r>
             <a:r>
-              <a:rPr lang="en-US" sz="2000" dirty="0">
+              <a:rPr lang="en-US" sz="1800" dirty="0">
                 <a:latin typeface="Consolas" panose="020B0609020204030204" pitchFamily="49" charset="0"/>
               </a:rPr>
               <a:t> product)</a:t>
@@ -12950,12 +12974,12 @@
               <a:buNone/>
             </a:pPr>
             <a:r>
-              <a:rPr lang="en-US" sz="2000" dirty="0">
+              <a:rPr lang="en-US" sz="1800" dirty="0">
                 <a:latin typeface="Consolas" panose="020B0609020204030204" pitchFamily="49" charset="0"/>
               </a:rPr>
               <a:t>}</a:t>
             </a:r>
-            <a:endParaRPr lang="ru-RU" sz="1800" dirty="0">
+            <a:endParaRPr lang="ru-RU" sz="1600" dirty="0">
               <a:latin typeface="Consolas" panose="020B0609020204030204" pitchFamily="49" charset="0"/>
             </a:endParaRPr>
           </a:p>

</xml_diff>

<commit_message>
Removing old solved and fixes for new solved
</commit_message>
<xml_diff>
--- a/legacy.pptx
+++ b/legacy.pptx
@@ -13035,21 +13035,48 @@
             </a:pPr>
             <a:r>
               <a:rPr lang="ru-RU" sz="2400" dirty="0"/>
-              <a:t>Напиши </a:t>
-            </a:r>
-            <a:r>
-              <a:rPr lang="ru-RU" sz="2400" dirty="0" err="1"/>
-              <a:t>характеризационные</a:t>
+              <a:t>Сделай </a:t>
+            </a:r>
+            <a:r>
+              <a:rPr lang="ru-RU" sz="2400" b="1" dirty="0"/>
+              <a:t>минимальный</a:t>
             </a:r>
             <a:r>
               <a:rPr lang="ru-RU" sz="2400" dirty="0"/>
-              <a:t> тесты на </a:t>
-            </a:r>
-            <a:r>
-              <a:rPr lang="en-US" sz="2400" dirty="0" err="1"/>
-              <a:t>ProviderProcessor</a:t>
+              <a:t> подготовительный рефакторинг</a:t>
             </a:r>
             <a:endParaRPr lang="en-US" sz="2400" dirty="0"/>
+          </a:p>
+          <a:p>
+            <a:pPr marL="1200095" lvl="1" indent="-457200"/>
+            <a:r>
+              <a:rPr lang="ru-RU" sz="2000" dirty="0"/>
+              <a:t>Виртуальные методы + </a:t>
+            </a:r>
+            <a:r>
+              <a:rPr lang="en-US" sz="2000" dirty="0" err="1"/>
+              <a:t>FakeItEasy</a:t>
+            </a:r>
+            <a:endParaRPr lang="en-US" sz="2000" dirty="0"/>
+          </a:p>
+          <a:p>
+            <a:pPr marL="1200095" lvl="1" indent="-457200"/>
+            <a:r>
+              <a:rPr lang="en-US" sz="2000" dirty="0" err="1"/>
+              <a:t>MemoryAppender</a:t>
+            </a:r>
+            <a:r>
+              <a:rPr lang="en-US" sz="2000" dirty="0"/>
+              <a:t> </a:t>
+            </a:r>
+            <a:r>
+              <a:rPr lang="ru-RU" sz="2000" dirty="0"/>
+              <a:t>для </a:t>
+            </a:r>
+            <a:r>
+              <a:rPr lang="en-US" sz="2000" dirty="0"/>
+              <a:t>Log4Net</a:t>
+            </a:r>
           </a:p>
           <a:p>
             <a:pPr marL="457200" indent="-457200">
@@ -13058,12 +13085,35 @@
             </a:pPr>
             <a:r>
               <a:rPr lang="ru-RU" sz="2400" dirty="0"/>
-              <a:t>Переведи </a:t>
+              <a:t>Напиши </a:t>
+            </a:r>
+            <a:r>
+              <a:rPr lang="ru-RU" sz="2400" dirty="0" err="1"/>
+              <a:t>характеризационные</a:t>
+            </a:r>
+            <a:r>
+              <a:rPr lang="ru-RU" sz="2400" dirty="0"/>
+              <a:t> тесты на </a:t>
             </a:r>
             <a:r>
               <a:rPr lang="en-US" sz="2400" dirty="0" err="1"/>
               <a:t>ProviderProcessor</a:t>
             </a:r>
+            <a:endParaRPr lang="ru-RU" sz="2400" dirty="0"/>
+          </a:p>
+          <a:p>
+            <a:pPr marL="457200" indent="-457200">
+              <a:buFont typeface="+mj-lt"/>
+              <a:buAutoNum type="arabicPeriod"/>
+            </a:pPr>
+            <a:r>
+              <a:rPr lang="ru-RU" sz="2400" dirty="0"/>
+              <a:t>Переведи </a:t>
+            </a:r>
+            <a:r>
+              <a:rPr lang="en-US" sz="2400" dirty="0" err="1"/>
+              <a:t>ProviderProcessor</a:t>
+            </a:r>
             <a:r>
               <a:rPr lang="ru-RU" sz="2400" dirty="0"/>
               <a:t> на </a:t>
@@ -13073,13 +13123,6 @@
               <a:t>ProductValidator</a:t>
             </a:r>
             <a:endParaRPr lang="ru-RU" sz="2400" dirty="0"/>
-          </a:p>
-          <a:p>
-            <a:pPr marL="1200095" lvl="1" indent="-457200"/>
-            <a:r>
-              <a:rPr lang="ru-RU" sz="2000" dirty="0"/>
-              <a:t>Ничего не сломай!</a:t>
-            </a:r>
           </a:p>
         </p:txBody>
       </p:sp>
@@ -13308,6 +13351,68 @@
                                   </p:childTnLst>
                                 </p:cTn>
                               </p:par>
+                              <p:par>
+                                <p:cTn id="15" presetID="1" presetClass="entr" presetSubtype="0" fill="hold" nodeType="withEffect">
+                                  <p:stCondLst>
+                                    <p:cond delay="0"/>
+                                  </p:stCondLst>
+                                  <p:childTnLst>
+                                    <p:set>
+                                      <p:cBhvr>
+                                        <p:cTn id="16" dur="1" fill="hold">
+                                          <p:stCondLst>
+                                            <p:cond delay="0"/>
+                                          </p:stCondLst>
+                                        </p:cTn>
+                                        <p:tgtEl>
+                                          <p:spTgt spid="3">
+                                            <p:txEl>
+                                              <p:pRg st="9" end="9"/>
+                                            </p:txEl>
+                                          </p:spTgt>
+                                        </p:tgtEl>
+                                        <p:attrNameLst>
+                                          <p:attrName>style.visibility</p:attrName>
+                                        </p:attrNameLst>
+                                      </p:cBhvr>
+                                      <p:to>
+                                        <p:strVal val="visible"/>
+                                      </p:to>
+                                    </p:set>
+                                  </p:childTnLst>
+                                </p:cTn>
+                              </p:par>
+                              <p:par>
+                                <p:cTn id="17" presetID="1" presetClass="entr" presetSubtype="0" fill="hold" nodeType="withEffect">
+                                  <p:stCondLst>
+                                    <p:cond delay="0"/>
+                                  </p:stCondLst>
+                                  <p:childTnLst>
+                                    <p:set>
+                                      <p:cBhvr>
+                                        <p:cTn id="18" dur="1" fill="hold">
+                                          <p:stCondLst>
+                                            <p:cond delay="0"/>
+                                          </p:stCondLst>
+                                        </p:cTn>
+                                        <p:tgtEl>
+                                          <p:spTgt spid="3">
+                                            <p:txEl>
+                                              <p:pRg st="10" end="10"/>
+                                            </p:txEl>
+                                          </p:spTgt>
+                                        </p:tgtEl>
+                                        <p:attrNameLst>
+                                          <p:attrName>style.visibility</p:attrName>
+                                        </p:attrNameLst>
+                                      </p:cBhvr>
+                                      <p:to>
+                                        <p:strVal val="visible"/>
+                                      </p:to>
+                                    </p:set>
+                                  </p:childTnLst>
+                                </p:cTn>
+                              </p:par>
                             </p:childTnLst>
                           </p:cTn>
                         </p:par>
@@ -13553,7 +13658,7 @@
           <a:p>
             <a:pPr marL="1257245" lvl="1" indent="-514350"/>
             <a:r>
-              <a:rPr lang="ru-RU" sz="2400" b="1" dirty="0"/>
+              <a:rPr lang="ru-RU" sz="2400" dirty="0"/>
               <a:t>Сделай подготовительный рефакторинг</a:t>
             </a:r>
           </a:p>
@@ -13570,15 +13675,15 @@
           <a:p>
             <a:pPr marL="1257245" lvl="1" indent="-514350"/>
             <a:r>
-              <a:rPr lang="ru-RU" sz="2400" b="1" dirty="0"/>
+              <a:rPr lang="ru-RU" sz="2400" dirty="0"/>
               <a:t>Напиши </a:t>
             </a:r>
             <a:r>
-              <a:rPr lang="ru-RU" sz="2400" b="1" dirty="0" err="1"/>
+              <a:rPr lang="ru-RU" sz="2400" dirty="0" err="1"/>
               <a:t>характеризационные</a:t>
             </a:r>
             <a:r>
-              <a:rPr lang="ru-RU" sz="2400" b="1" dirty="0"/>
+              <a:rPr lang="ru-RU" sz="2400" dirty="0"/>
               <a:t> тесты</a:t>
             </a:r>
           </a:p>

</xml_diff>

<commit_message>
New Read.me & fix pptx
</commit_message>
<xml_diff>
--- a/legacy.pptx
+++ b/legacy.pptx
@@ -7149,7 +7149,7 @@
           <a:p>
             <a:fld id="{16E5F246-0B7D-44DF-8C1B-EDFCA5DA626A}" type="datetimeFigureOut">
               <a:rPr lang="ru-RU" smtClean="0"/>
-              <a:t>25.09.2017</a:t>
+              <a:t>26.09.2017</a:t>
             </a:fld>
             <a:endParaRPr lang="ru-RU" dirty="0"/>
           </a:p>
@@ -12593,6 +12593,10 @@
                 <a:hlinkClick r:id="rId3"/>
               </a:rPr>
               <a:t>AutoApprover</a:t>
+            </a:r>
+            <a:r>
+              <a:rPr lang="en-US" sz="2400"/>
+              <a:t> Reporter</a:t>
             </a:r>
             <a:endParaRPr lang="en-US" sz="2400" dirty="0"/>
           </a:p>

</xml_diff>

<commit_message>
Add animations in 3 lists
</commit_message>
<xml_diff>
--- a/legacy.pptx
+++ b/legacy.pptx
@@ -2500,6 +2500,13 @@
         </dgm:presLayoutVars>
       </dgm:prSet>
       <dgm:spPr/>
+      <dgm:t>
+        <a:bodyPr/>
+        <a:lstStyle/>
+        <a:p>
+          <a:endParaRPr lang="ru-RU"/>
+        </a:p>
+      </dgm:t>
     </dgm:pt>
     <dgm:pt modelId="{CF6D50B3-578A-4EA0-A5A0-492FA729F6ED}" type="pres">
       <dgm:prSet presAssocID="{B75F6A3A-9A51-4DF3-8A57-9AEB0739425C}" presName="composite" presStyleCnt="0"/>
@@ -2512,6 +2519,13 @@
         </dgm:presLayoutVars>
       </dgm:prSet>
       <dgm:spPr/>
+      <dgm:t>
+        <a:bodyPr/>
+        <a:lstStyle/>
+        <a:p>
+          <a:endParaRPr lang="ru-RU"/>
+        </a:p>
+      </dgm:t>
     </dgm:pt>
     <dgm:pt modelId="{61EB78D8-69FF-471D-8FEB-71388C442F55}" type="pres">
       <dgm:prSet presAssocID="{B75F6A3A-9A51-4DF3-8A57-9AEB0739425C}" presName="rect1" presStyleLbl="alignImgPlace1" presStyleIdx="0" presStyleCnt="1" custScaleX="596594" custScaleY="114980" custLinFactX="-64576" custLinFactNeighborX="-100000" custLinFactNeighborY="-13065"/>
@@ -2533,9 +2547,9 @@
     </dgm:pt>
   </dgm:ptLst>
   <dgm:cxnLst>
+    <dgm:cxn modelId="{017518C9-1619-4B19-AA03-86BA999BA287}" srcId="{EAB81984-5B84-4970-8447-2B456B8C58DF}" destId="{B75F6A3A-9A51-4DF3-8A57-9AEB0739425C}" srcOrd="0" destOrd="0" parTransId="{203596AF-4F49-40BA-B1E1-11BDD34B512E}" sibTransId="{A056157B-3867-49A4-9195-F3A4F3FBBA8E}"/>
     <dgm:cxn modelId="{1CEAA455-5BF4-4666-95B8-390900AB8124}" type="presOf" srcId="{EAB81984-5B84-4970-8447-2B456B8C58DF}" destId="{3A252E36-3D7E-49E5-B812-EE4CACF0D5CF}" srcOrd="0" destOrd="0" presId="urn:microsoft.com/office/officeart/2008/layout/PictureGrid"/>
     <dgm:cxn modelId="{147A14B3-96E8-4139-969B-9DB1BCB4D95E}" type="presOf" srcId="{B75F6A3A-9A51-4DF3-8A57-9AEB0739425C}" destId="{B29ABF60-EC0F-45AD-A90E-9C76D15C2F14}" srcOrd="0" destOrd="0" presId="urn:microsoft.com/office/officeart/2008/layout/PictureGrid"/>
-    <dgm:cxn modelId="{017518C9-1619-4B19-AA03-86BA999BA287}" srcId="{EAB81984-5B84-4970-8447-2B456B8C58DF}" destId="{B75F6A3A-9A51-4DF3-8A57-9AEB0739425C}" srcOrd="0" destOrd="0" parTransId="{203596AF-4F49-40BA-B1E1-11BDD34B512E}" sibTransId="{A056157B-3867-49A4-9195-F3A4F3FBBA8E}"/>
     <dgm:cxn modelId="{D3458AFA-605E-43EE-8C8A-0E0C1E3CD931}" type="presParOf" srcId="{3A252E36-3D7E-49E5-B812-EE4CACF0D5CF}" destId="{CF6D50B3-578A-4EA0-A5A0-492FA729F6ED}" srcOrd="0" destOrd="0" presId="urn:microsoft.com/office/officeart/2008/layout/PictureGrid"/>
     <dgm:cxn modelId="{9835F3F3-3E30-4AC4-AD89-BC095FA9A878}" type="presParOf" srcId="{CF6D50B3-578A-4EA0-A5A0-492FA729F6ED}" destId="{B29ABF60-EC0F-45AD-A90E-9C76D15C2F14}" srcOrd="0" destOrd="0" presId="urn:microsoft.com/office/officeart/2008/layout/PictureGrid"/>
     <dgm:cxn modelId="{70FA379F-7827-49B9-806E-1FD72CAE8F89}" type="presParOf" srcId="{CF6D50B3-578A-4EA0-A5A0-492FA729F6ED}" destId="{61EB78D8-69FF-471D-8FEB-71388C442F55}" srcOrd="1" destOrd="0" presId="urn:microsoft.com/office/officeart/2008/layout/PictureGrid"/>
@@ -2607,6 +2621,13 @@
         </dgm:presLayoutVars>
       </dgm:prSet>
       <dgm:spPr/>
+      <dgm:t>
+        <a:bodyPr/>
+        <a:lstStyle/>
+        <a:p>
+          <a:endParaRPr lang="ru-RU"/>
+        </a:p>
+      </dgm:t>
     </dgm:pt>
     <dgm:pt modelId="{CF6D50B3-578A-4EA0-A5A0-492FA729F6ED}" type="pres">
       <dgm:prSet presAssocID="{B75F6A3A-9A51-4DF3-8A57-9AEB0739425C}" presName="composite" presStyleCnt="0"/>
@@ -2619,6 +2640,13 @@
         </dgm:presLayoutVars>
       </dgm:prSet>
       <dgm:spPr/>
+      <dgm:t>
+        <a:bodyPr/>
+        <a:lstStyle/>
+        <a:p>
+          <a:endParaRPr lang="ru-RU"/>
+        </a:p>
+      </dgm:t>
     </dgm:pt>
     <dgm:pt modelId="{61EB78D8-69FF-471D-8FEB-71388C442F55}" type="pres">
       <dgm:prSet presAssocID="{B75F6A3A-9A51-4DF3-8A57-9AEB0739425C}" presName="rect1" presStyleLbl="alignImgPlace1" presStyleIdx="0" presStyleCnt="1" custScaleX="596594" custScaleY="114980" custLinFactX="-64576" custLinFactNeighborX="-100000" custLinFactNeighborY="-13065"/>
@@ -2640,9 +2668,9 @@
     </dgm:pt>
   </dgm:ptLst>
   <dgm:cxnLst>
+    <dgm:cxn modelId="{017518C9-1619-4B19-AA03-86BA999BA287}" srcId="{EAB81984-5B84-4970-8447-2B456B8C58DF}" destId="{B75F6A3A-9A51-4DF3-8A57-9AEB0739425C}" srcOrd="0" destOrd="0" parTransId="{203596AF-4F49-40BA-B1E1-11BDD34B512E}" sibTransId="{A056157B-3867-49A4-9195-F3A4F3FBBA8E}"/>
     <dgm:cxn modelId="{1CEAA455-5BF4-4666-95B8-390900AB8124}" type="presOf" srcId="{EAB81984-5B84-4970-8447-2B456B8C58DF}" destId="{3A252E36-3D7E-49E5-B812-EE4CACF0D5CF}" srcOrd="0" destOrd="0" presId="urn:microsoft.com/office/officeart/2008/layout/PictureGrid"/>
     <dgm:cxn modelId="{147A14B3-96E8-4139-969B-9DB1BCB4D95E}" type="presOf" srcId="{B75F6A3A-9A51-4DF3-8A57-9AEB0739425C}" destId="{B29ABF60-EC0F-45AD-A90E-9C76D15C2F14}" srcOrd="0" destOrd="0" presId="urn:microsoft.com/office/officeart/2008/layout/PictureGrid"/>
-    <dgm:cxn modelId="{017518C9-1619-4B19-AA03-86BA999BA287}" srcId="{EAB81984-5B84-4970-8447-2B456B8C58DF}" destId="{B75F6A3A-9A51-4DF3-8A57-9AEB0739425C}" srcOrd="0" destOrd="0" parTransId="{203596AF-4F49-40BA-B1E1-11BDD34B512E}" sibTransId="{A056157B-3867-49A4-9195-F3A4F3FBBA8E}"/>
     <dgm:cxn modelId="{D3458AFA-605E-43EE-8C8A-0E0C1E3CD931}" type="presParOf" srcId="{3A252E36-3D7E-49E5-B812-EE4CACF0D5CF}" destId="{CF6D50B3-578A-4EA0-A5A0-492FA729F6ED}" srcOrd="0" destOrd="0" presId="urn:microsoft.com/office/officeart/2008/layout/PictureGrid"/>
     <dgm:cxn modelId="{9835F3F3-3E30-4AC4-AD89-BC095FA9A878}" type="presParOf" srcId="{CF6D50B3-578A-4EA0-A5A0-492FA729F6ED}" destId="{B29ABF60-EC0F-45AD-A90E-9C76D15C2F14}" srcOrd="0" destOrd="0" presId="urn:microsoft.com/office/officeart/2008/layout/PictureGrid"/>
     <dgm:cxn modelId="{70FA379F-7827-49B9-806E-1FD72CAE8F89}" type="presParOf" srcId="{CF6D50B3-578A-4EA0-A5A0-492FA729F6ED}" destId="{61EB78D8-69FF-471D-8FEB-71388C442F55}" srcOrd="1" destOrd="0" presId="urn:microsoft.com/office/officeart/2008/layout/PictureGrid"/>
@@ -2732,6 +2760,13 @@
         </dgm:presLayoutVars>
       </dgm:prSet>
       <dgm:spPr/>
+      <dgm:t>
+        <a:bodyPr/>
+        <a:lstStyle/>
+        <a:p>
+          <a:endParaRPr lang="ru-RU"/>
+        </a:p>
+      </dgm:t>
     </dgm:pt>
     <dgm:pt modelId="{65D73C51-61AB-436D-8191-975603FC9C68}" type="pres">
       <dgm:prSet presAssocID="{9C9C0585-42CE-4F34-A2BB-F1377DA03788}" presName="composite" presStyleCnt="0"/>
@@ -2744,6 +2779,13 @@
         </dgm:presLayoutVars>
       </dgm:prSet>
       <dgm:spPr/>
+      <dgm:t>
+        <a:bodyPr/>
+        <a:lstStyle/>
+        <a:p>
+          <a:endParaRPr lang="ru-RU"/>
+        </a:p>
+      </dgm:t>
     </dgm:pt>
     <dgm:pt modelId="{DFDA3CA3-5C68-4A2F-A4A8-285063A35D87}" type="pres">
       <dgm:prSet presAssocID="{9C9C0585-42CE-4F34-A2BB-F1377DA03788}" presName="rect1" presStyleLbl="alignImgPlace1" presStyleIdx="0" presStyleCnt="1" custScaleX="62421" custScaleY="62421" custLinFactNeighborX="1076" custLinFactNeighborY="-52209"/>
@@ -2768,8 +2810,8 @@
     </dgm:pt>
   </dgm:ptLst>
   <dgm:cxnLst>
+    <dgm:cxn modelId="{A177C822-7566-4410-A889-706A6CE15148}" srcId="{8F66C165-B39F-46D3-B19F-623799541DD3}" destId="{9C9C0585-42CE-4F34-A2BB-F1377DA03788}" srcOrd="0" destOrd="0" parTransId="{4E5DCF2B-AAE7-41E2-837F-518128C03597}" sibTransId="{56F70C7F-1925-4DBA-9BD6-AF5E91799A59}"/>
     <dgm:cxn modelId="{A9E27516-E8E4-42A7-A155-024D48E79559}" type="presOf" srcId="{8F66C165-B39F-46D3-B19F-623799541DD3}" destId="{B6F028CB-F170-4FEF-BC3A-25F0E90D434A}" srcOrd="0" destOrd="0" presId="urn:microsoft.com/office/officeart/2008/layout/PictureGrid"/>
-    <dgm:cxn modelId="{A177C822-7566-4410-A889-706A6CE15148}" srcId="{8F66C165-B39F-46D3-B19F-623799541DD3}" destId="{9C9C0585-42CE-4F34-A2BB-F1377DA03788}" srcOrd="0" destOrd="0" parTransId="{4E5DCF2B-AAE7-41E2-837F-518128C03597}" sibTransId="{56F70C7F-1925-4DBA-9BD6-AF5E91799A59}"/>
     <dgm:cxn modelId="{ACD53F50-5BA1-48C9-B5DF-09BF6DA4DE65}" type="presOf" srcId="{9C9C0585-42CE-4F34-A2BB-F1377DA03788}" destId="{A30F2283-C0A4-4A69-BCBE-833D967155A2}" srcOrd="0" destOrd="0" presId="urn:microsoft.com/office/officeart/2008/layout/PictureGrid"/>
     <dgm:cxn modelId="{CC189C1C-06A1-4F03-B886-67BF46A53703}" type="presParOf" srcId="{B6F028CB-F170-4FEF-BC3A-25F0E90D434A}" destId="{65D73C51-61AB-436D-8191-975603FC9C68}" srcOrd="0" destOrd="0" presId="urn:microsoft.com/office/officeart/2008/layout/PictureGrid"/>
     <dgm:cxn modelId="{CD7DB92E-B84F-43A0-AC2D-FBBFB40722EE}" type="presParOf" srcId="{65D73C51-61AB-436D-8191-975603FC9C68}" destId="{A30F2283-C0A4-4A69-BCBE-833D967155A2}" srcOrd="0" destOrd="0" presId="urn:microsoft.com/office/officeart/2008/layout/PictureGrid"/>
@@ -2830,7 +2872,7 @@
         </a:bodyPr>
         <a:lstStyle/>
         <a:p>
-          <a:pPr marL="0" lvl="0" indent="0" algn="l" defTabSz="222250">
+          <a:pPr lvl="0" algn="l" defTabSz="222250">
             <a:lnSpc>
               <a:spcPct val="90000"/>
             </a:lnSpc>
@@ -2840,7 +2882,6 @@
             <a:spcAft>
               <a:spcPct val="35000"/>
             </a:spcAft>
-            <a:buNone/>
           </a:pPr>
           <a:r>
             <a:rPr lang="ru-RU" sz="500" kern="1200" dirty="0"/>
@@ -2954,7 +2995,7 @@
         </a:bodyPr>
         <a:lstStyle/>
         <a:p>
-          <a:pPr marL="0" lvl="0" indent="0" algn="l" defTabSz="222250">
+          <a:pPr lvl="0" algn="l" defTabSz="222250">
             <a:lnSpc>
               <a:spcPct val="90000"/>
             </a:lnSpc>
@@ -2964,7 +3005,6 @@
             <a:spcAft>
               <a:spcPct val="35000"/>
             </a:spcAft>
-            <a:buNone/>
           </a:pPr>
           <a:r>
             <a:rPr lang="ru-RU" sz="500" kern="1200" dirty="0"/>
@@ -3078,7 +3118,7 @@
         </a:bodyPr>
         <a:lstStyle/>
         <a:p>
-          <a:pPr marL="0" lvl="0" indent="0" algn="ctr" defTabSz="1778000">
+          <a:pPr lvl="0" algn="ctr" defTabSz="1778000">
             <a:lnSpc>
               <a:spcPct val="90000"/>
             </a:lnSpc>
@@ -3088,7 +3128,6 @@
             <a:spcAft>
               <a:spcPct val="35000"/>
             </a:spcAft>
-            <a:buNone/>
           </a:pPr>
           <a:r>
             <a:rPr lang="ru-RU" sz="4000" kern="1200" dirty="0">
@@ -7149,7 +7188,7 @@
           <a:p>
             <a:fld id="{16E5F246-0B7D-44DF-8C1B-EDFCA5DA626A}" type="datetimeFigureOut">
               <a:rPr lang="ru-RU" smtClean="0"/>
-              <a:t>26.09.2017</a:t>
+              <a:t>16.12.2017</a:t>
             </a:fld>
             <a:endParaRPr lang="ru-RU" dirty="0"/>
           </a:p>
@@ -12209,6 +12248,13 @@
   <p:clrMapOvr>
     <a:masterClrMapping/>
   </p:clrMapOvr>
+  <p:timing>
+    <p:tnLst>
+      <p:par>
+        <p:cTn id="1" dur="indefinite" restart="never" nodeType="tmRoot"/>
+      </p:par>
+    </p:tnLst>
+  </p:timing>
 </p:sld>
 </file>
 
@@ -12303,6 +12349,13 @@
   <p:clrMapOvr>
     <a:masterClrMapping/>
   </p:clrMapOvr>
+  <p:timing>
+    <p:tnLst>
+      <p:par>
+        <p:cTn id="1" dur="indefinite" restart="never" nodeType="tmRoot"/>
+      </p:par>
+    </p:tnLst>
+  </p:timing>
 </p:sld>
 </file>
 
@@ -12423,6 +12476,186 @@
   <p:clrMapOvr>
     <a:masterClrMapping/>
   </p:clrMapOvr>
+  <p:timing>
+    <p:tnLst>
+      <p:par>
+        <p:cTn id="1" dur="indefinite" restart="never" nodeType="tmRoot">
+          <p:childTnLst>
+            <p:seq concurrent="1" nextAc="seek">
+              <p:cTn id="2" dur="indefinite" nodeType="mainSeq">
+                <p:childTnLst>
+                  <p:par>
+                    <p:cTn id="3" fill="hold">
+                      <p:stCondLst>
+                        <p:cond delay="indefinite"/>
+                      </p:stCondLst>
+                      <p:childTnLst>
+                        <p:par>
+                          <p:cTn id="4" fill="hold">
+                            <p:stCondLst>
+                              <p:cond delay="0"/>
+                            </p:stCondLst>
+                            <p:childTnLst>
+                              <p:par>
+                                <p:cTn id="5" presetID="1" presetClass="entr" presetSubtype="0" fill="hold" grpId="0" nodeType="clickEffect">
+                                  <p:stCondLst>
+                                    <p:cond delay="0"/>
+                                  </p:stCondLst>
+                                  <p:childTnLst>
+                                    <p:set>
+                                      <p:cBhvr>
+                                        <p:cTn id="6" dur="1" fill="hold">
+                                          <p:stCondLst>
+                                            <p:cond delay="0"/>
+                                          </p:stCondLst>
+                                        </p:cTn>
+                                        <p:tgtEl>
+                                          <p:spTgt spid="3">
+                                            <p:txEl>
+                                              <p:pRg st="1" end="1"/>
+                                            </p:txEl>
+                                          </p:spTgt>
+                                        </p:tgtEl>
+                                        <p:attrNameLst>
+                                          <p:attrName>style.visibility</p:attrName>
+                                        </p:attrNameLst>
+                                      </p:cBhvr>
+                                      <p:to>
+                                        <p:strVal val="visible"/>
+                                      </p:to>
+                                    </p:set>
+                                  </p:childTnLst>
+                                </p:cTn>
+                              </p:par>
+                            </p:childTnLst>
+                          </p:cTn>
+                        </p:par>
+                      </p:childTnLst>
+                    </p:cTn>
+                  </p:par>
+                  <p:par>
+                    <p:cTn id="7" fill="hold">
+                      <p:stCondLst>
+                        <p:cond delay="indefinite"/>
+                      </p:stCondLst>
+                      <p:childTnLst>
+                        <p:par>
+                          <p:cTn id="8" fill="hold">
+                            <p:stCondLst>
+                              <p:cond delay="0"/>
+                            </p:stCondLst>
+                            <p:childTnLst>
+                              <p:par>
+                                <p:cTn id="9" presetID="1" presetClass="entr" presetSubtype="0" fill="hold" grpId="0" nodeType="clickEffect">
+                                  <p:stCondLst>
+                                    <p:cond delay="0"/>
+                                  </p:stCondLst>
+                                  <p:childTnLst>
+                                    <p:set>
+                                      <p:cBhvr>
+                                        <p:cTn id="10" dur="1" fill="hold">
+                                          <p:stCondLst>
+                                            <p:cond delay="0"/>
+                                          </p:stCondLst>
+                                        </p:cTn>
+                                        <p:tgtEl>
+                                          <p:spTgt spid="3">
+                                            <p:txEl>
+                                              <p:pRg st="2" end="2"/>
+                                            </p:txEl>
+                                          </p:spTgt>
+                                        </p:tgtEl>
+                                        <p:attrNameLst>
+                                          <p:attrName>style.visibility</p:attrName>
+                                        </p:attrNameLst>
+                                      </p:cBhvr>
+                                      <p:to>
+                                        <p:strVal val="visible"/>
+                                      </p:to>
+                                    </p:set>
+                                  </p:childTnLst>
+                                </p:cTn>
+                              </p:par>
+                            </p:childTnLst>
+                          </p:cTn>
+                        </p:par>
+                      </p:childTnLst>
+                    </p:cTn>
+                  </p:par>
+                  <p:par>
+                    <p:cTn id="11" fill="hold">
+                      <p:stCondLst>
+                        <p:cond delay="indefinite"/>
+                      </p:stCondLst>
+                      <p:childTnLst>
+                        <p:par>
+                          <p:cTn id="12" fill="hold">
+                            <p:stCondLst>
+                              <p:cond delay="0"/>
+                            </p:stCondLst>
+                            <p:childTnLst>
+                              <p:par>
+                                <p:cTn id="13" presetID="1" presetClass="entr" presetSubtype="0" fill="hold" grpId="0" nodeType="clickEffect">
+                                  <p:stCondLst>
+                                    <p:cond delay="0"/>
+                                  </p:stCondLst>
+                                  <p:childTnLst>
+                                    <p:set>
+                                      <p:cBhvr>
+                                        <p:cTn id="14" dur="1" fill="hold">
+                                          <p:stCondLst>
+                                            <p:cond delay="0"/>
+                                          </p:stCondLst>
+                                        </p:cTn>
+                                        <p:tgtEl>
+                                          <p:spTgt spid="3">
+                                            <p:txEl>
+                                              <p:pRg st="3" end="3"/>
+                                            </p:txEl>
+                                          </p:spTgt>
+                                        </p:tgtEl>
+                                        <p:attrNameLst>
+                                          <p:attrName>style.visibility</p:attrName>
+                                        </p:attrNameLst>
+                                      </p:cBhvr>
+                                      <p:to>
+                                        <p:strVal val="visible"/>
+                                      </p:to>
+                                    </p:set>
+                                  </p:childTnLst>
+                                </p:cTn>
+                              </p:par>
+                            </p:childTnLst>
+                          </p:cTn>
+                        </p:par>
+                      </p:childTnLst>
+                    </p:cTn>
+                  </p:par>
+                </p:childTnLst>
+              </p:cTn>
+              <p:prevCondLst>
+                <p:cond evt="onPrev" delay="0">
+                  <p:tgtEl>
+                    <p:sldTgt/>
+                  </p:tgtEl>
+                </p:cond>
+              </p:prevCondLst>
+              <p:nextCondLst>
+                <p:cond evt="onNext" delay="0">
+                  <p:tgtEl>
+                    <p:sldTgt/>
+                  </p:tgtEl>
+                </p:cond>
+              </p:nextCondLst>
+            </p:seq>
+          </p:childTnLst>
+        </p:cTn>
+      </p:par>
+    </p:tnLst>
+    <p:bldLst>
+      <p:bldP spid="3" grpId="0" uiExpand="1" build="p"/>
+    </p:bldLst>
+  </p:timing>
 </p:sld>
 </file>
 
@@ -12479,6 +12712,13 @@
   <p:clrMapOvr>
     <a:masterClrMapping/>
   </p:clrMapOvr>
+  <p:timing>
+    <p:tnLst>
+      <p:par>
+        <p:cTn id="1" dur="indefinite" restart="never" nodeType="tmRoot"/>
+      </p:par>
+    </p:tnLst>
+  </p:timing>
 </p:sld>
 </file>
 
@@ -12678,6 +12918,13 @@
   <p:clrMapOvr>
     <a:masterClrMapping/>
   </p:clrMapOvr>
+  <p:timing>
+    <p:tnLst>
+      <p:par>
+        <p:cTn id="1" dur="indefinite" restart="never" nodeType="tmRoot"/>
+      </p:par>
+    </p:tnLst>
+  </p:timing>
 </p:sld>
 </file>
 
@@ -12845,6 +13092,13 @@
   <p:clrMapOvr>
     <a:masterClrMapping/>
   </p:clrMapOvr>
+  <p:timing>
+    <p:tnLst>
+      <p:par>
+        <p:cTn id="1" dur="indefinite" restart="never" nodeType="tmRoot"/>
+      </p:par>
+    </p:tnLst>
+  </p:timing>
 </p:sld>
 </file>
 
@@ -13501,7 +13755,12 @@
             <p:ph sz="quarter" idx="13"/>
           </p:nvPr>
         </p:nvSpPr>
-        <p:spPr/>
+        <p:spPr>
+          <a:xfrm>
+            <a:off x="1295400" y="1628779"/>
+            <a:ext cx="9601133" cy="5112589"/>
+          </a:xfrm>
+        </p:spPr>
         <p:txBody>
           <a:bodyPr>
             <a:normAutofit/>
@@ -13654,7 +13913,46 @@
               <a:rPr lang="ru-RU" sz="2400" dirty="0">
                 <a:latin typeface="+mn-lt"/>
               </a:rPr>
-              <a:t>надо сделать виртуальными</a:t>
+              <a:t>надо сделать </a:t>
+            </a:r>
+            <a:r>
+              <a:rPr lang="ru-RU" sz="2400" dirty="0" smtClean="0">
+                <a:latin typeface="+mn-lt"/>
+              </a:rPr>
+              <a:t>виртуальными</a:t>
+            </a:r>
+            <a:endParaRPr lang="en-US" sz="2400" dirty="0" smtClean="0">
+              <a:latin typeface="+mn-lt"/>
+            </a:endParaRPr>
+          </a:p>
+          <a:p>
+            <a:pPr marL="457200" indent="-457200">
+              <a:buFont typeface="Arial" panose="020B0604020202020204" pitchFamily="34" charset="0"/>
+              <a:buChar char="•"/>
+            </a:pPr>
+            <a:r>
+              <a:rPr lang="ru-RU" sz="2400" dirty="0" smtClean="0">
+                <a:latin typeface="+mn-lt"/>
+              </a:rPr>
+              <a:t>Заполните </a:t>
+            </a:r>
+            <a:r>
+              <a:rPr lang="en-US" sz="2400" dirty="0" smtClean="0">
+                <a:latin typeface="+mn-lt"/>
+              </a:rPr>
+              <a:t>Authors</a:t>
+            </a:r>
+            <a:r>
+              <a:rPr lang="ru-RU" sz="2400" dirty="0" smtClean="0">
+                <a:latin typeface="+mn-lt"/>
+              </a:rPr>
+              <a:t> в классе </a:t>
+            </a:r>
+            <a:r>
+              <a:rPr lang="en-US" sz="2400" dirty="0">
+                <a:latin typeface="+mn-lt"/>
+              </a:rPr>
+              <a:t>YourName</a:t>
             </a:r>
             <a:endParaRPr lang="en-US" sz="2400" dirty="0">
               <a:latin typeface="+mn-lt"/>
@@ -13709,6 +14007,13 @@
   <p:clrMapOvr>
     <a:masterClrMapping/>
   </p:clrMapOvr>
+  <p:timing>
+    <p:tnLst>
+      <p:par>
+        <p:cTn id="1" dur="indefinite" restart="never" nodeType="tmRoot"/>
+      </p:par>
+    </p:tnLst>
+  </p:timing>
 </p:sld>
 </file>
 
@@ -13887,6 +14192,359 @@
   <p:clrMapOvr>
     <a:masterClrMapping/>
   </p:clrMapOvr>
+  <p:timing>
+    <p:tnLst>
+      <p:par>
+        <p:cTn id="1" dur="indefinite" restart="never" nodeType="tmRoot">
+          <p:childTnLst>
+            <p:seq concurrent="1" nextAc="seek">
+              <p:cTn id="2" dur="indefinite" nodeType="mainSeq">
+                <p:childTnLst>
+                  <p:par>
+                    <p:cTn id="3" fill="hold">
+                      <p:stCondLst>
+                        <p:cond delay="indefinite"/>
+                      </p:stCondLst>
+                      <p:childTnLst>
+                        <p:par>
+                          <p:cTn id="4" fill="hold">
+                            <p:stCondLst>
+                              <p:cond delay="0"/>
+                            </p:stCondLst>
+                            <p:childTnLst>
+                              <p:par>
+                                <p:cTn id="5" presetID="1" presetClass="entr" presetSubtype="0" fill="hold" grpId="0" nodeType="clickEffect">
+                                  <p:stCondLst>
+                                    <p:cond delay="0"/>
+                                  </p:stCondLst>
+                                  <p:childTnLst>
+                                    <p:set>
+                                      <p:cBhvr>
+                                        <p:cTn id="6" dur="1" fill="hold">
+                                          <p:stCondLst>
+                                            <p:cond delay="0"/>
+                                          </p:stCondLst>
+                                        </p:cTn>
+                                        <p:tgtEl>
+                                          <p:spTgt spid="3">
+                                            <p:txEl>
+                                              <p:pRg st="2" end="2"/>
+                                            </p:txEl>
+                                          </p:spTgt>
+                                        </p:tgtEl>
+                                        <p:attrNameLst>
+                                          <p:attrName>style.visibility</p:attrName>
+                                        </p:attrNameLst>
+                                      </p:cBhvr>
+                                      <p:to>
+                                        <p:strVal val="visible"/>
+                                      </p:to>
+                                    </p:set>
+                                  </p:childTnLst>
+                                </p:cTn>
+                              </p:par>
+                              <p:par>
+                                <p:cTn id="7" presetID="1" presetClass="entr" presetSubtype="0" fill="hold" grpId="0" nodeType="withEffect">
+                                  <p:stCondLst>
+                                    <p:cond delay="0"/>
+                                  </p:stCondLst>
+                                  <p:childTnLst>
+                                    <p:set>
+                                      <p:cBhvr>
+                                        <p:cTn id="8" dur="1" fill="hold">
+                                          <p:stCondLst>
+                                            <p:cond delay="0"/>
+                                          </p:stCondLst>
+                                        </p:cTn>
+                                        <p:tgtEl>
+                                          <p:spTgt spid="3">
+                                            <p:txEl>
+                                              <p:pRg st="3" end="3"/>
+                                            </p:txEl>
+                                          </p:spTgt>
+                                        </p:tgtEl>
+                                        <p:attrNameLst>
+                                          <p:attrName>style.visibility</p:attrName>
+                                        </p:attrNameLst>
+                                      </p:cBhvr>
+                                      <p:to>
+                                        <p:strVal val="visible"/>
+                                      </p:to>
+                                    </p:set>
+                                  </p:childTnLst>
+                                </p:cTn>
+                              </p:par>
+                            </p:childTnLst>
+                          </p:cTn>
+                        </p:par>
+                      </p:childTnLst>
+                    </p:cTn>
+                  </p:par>
+                  <p:par>
+                    <p:cTn id="9" fill="hold">
+                      <p:stCondLst>
+                        <p:cond delay="indefinite"/>
+                      </p:stCondLst>
+                      <p:childTnLst>
+                        <p:par>
+                          <p:cTn id="10" fill="hold">
+                            <p:stCondLst>
+                              <p:cond delay="0"/>
+                            </p:stCondLst>
+                            <p:childTnLst>
+                              <p:par>
+                                <p:cTn id="11" presetID="1" presetClass="entr" presetSubtype="0" fill="hold" grpId="0" nodeType="clickEffect">
+                                  <p:stCondLst>
+                                    <p:cond delay="0"/>
+                                  </p:stCondLst>
+                                  <p:childTnLst>
+                                    <p:set>
+                                      <p:cBhvr>
+                                        <p:cTn id="12" dur="1" fill="hold">
+                                          <p:stCondLst>
+                                            <p:cond delay="0"/>
+                                          </p:stCondLst>
+                                        </p:cTn>
+                                        <p:tgtEl>
+                                          <p:spTgt spid="3">
+                                            <p:txEl>
+                                              <p:pRg st="4" end="4"/>
+                                            </p:txEl>
+                                          </p:spTgt>
+                                        </p:tgtEl>
+                                        <p:attrNameLst>
+                                          <p:attrName>style.visibility</p:attrName>
+                                        </p:attrNameLst>
+                                      </p:cBhvr>
+                                      <p:to>
+                                        <p:strVal val="visible"/>
+                                      </p:to>
+                                    </p:set>
+                                  </p:childTnLst>
+                                </p:cTn>
+                              </p:par>
+                              <p:par>
+                                <p:cTn id="13" presetID="1" presetClass="entr" presetSubtype="0" fill="hold" grpId="0" nodeType="withEffect">
+                                  <p:stCondLst>
+                                    <p:cond delay="0"/>
+                                  </p:stCondLst>
+                                  <p:childTnLst>
+                                    <p:set>
+                                      <p:cBhvr>
+                                        <p:cTn id="14" dur="1" fill="hold">
+                                          <p:stCondLst>
+                                            <p:cond delay="0"/>
+                                          </p:stCondLst>
+                                        </p:cTn>
+                                        <p:tgtEl>
+                                          <p:spTgt spid="3">
+                                            <p:txEl>
+                                              <p:pRg st="5" end="5"/>
+                                            </p:txEl>
+                                          </p:spTgt>
+                                        </p:tgtEl>
+                                        <p:attrNameLst>
+                                          <p:attrName>style.visibility</p:attrName>
+                                        </p:attrNameLst>
+                                      </p:cBhvr>
+                                      <p:to>
+                                        <p:strVal val="visible"/>
+                                      </p:to>
+                                    </p:set>
+                                  </p:childTnLst>
+                                </p:cTn>
+                              </p:par>
+                            </p:childTnLst>
+                          </p:cTn>
+                        </p:par>
+                      </p:childTnLst>
+                    </p:cTn>
+                  </p:par>
+                  <p:par>
+                    <p:cTn id="15" fill="hold">
+                      <p:stCondLst>
+                        <p:cond delay="indefinite"/>
+                      </p:stCondLst>
+                      <p:childTnLst>
+                        <p:par>
+                          <p:cTn id="16" fill="hold">
+                            <p:stCondLst>
+                              <p:cond delay="0"/>
+                            </p:stCondLst>
+                            <p:childTnLst>
+                              <p:par>
+                                <p:cTn id="17" presetID="1" presetClass="entr" presetSubtype="0" fill="hold" grpId="0" nodeType="clickEffect">
+                                  <p:stCondLst>
+                                    <p:cond delay="0"/>
+                                  </p:stCondLst>
+                                  <p:childTnLst>
+                                    <p:set>
+                                      <p:cBhvr>
+                                        <p:cTn id="18" dur="1" fill="hold">
+                                          <p:stCondLst>
+                                            <p:cond delay="0"/>
+                                          </p:stCondLst>
+                                        </p:cTn>
+                                        <p:tgtEl>
+                                          <p:spTgt spid="3">
+                                            <p:txEl>
+                                              <p:pRg st="6" end="6"/>
+                                            </p:txEl>
+                                          </p:spTgt>
+                                        </p:tgtEl>
+                                        <p:attrNameLst>
+                                          <p:attrName>style.visibility</p:attrName>
+                                        </p:attrNameLst>
+                                      </p:cBhvr>
+                                      <p:to>
+                                        <p:strVal val="visible"/>
+                                      </p:to>
+                                    </p:set>
+                                  </p:childTnLst>
+                                </p:cTn>
+                              </p:par>
+                              <p:par>
+                                <p:cTn id="19" presetID="1" presetClass="entr" presetSubtype="0" fill="hold" grpId="0" nodeType="withEffect">
+                                  <p:stCondLst>
+                                    <p:cond delay="0"/>
+                                  </p:stCondLst>
+                                  <p:childTnLst>
+                                    <p:set>
+                                      <p:cBhvr>
+                                        <p:cTn id="20" dur="1" fill="hold">
+                                          <p:stCondLst>
+                                            <p:cond delay="0"/>
+                                          </p:stCondLst>
+                                        </p:cTn>
+                                        <p:tgtEl>
+                                          <p:spTgt spid="3">
+                                            <p:txEl>
+                                              <p:pRg st="7" end="7"/>
+                                            </p:txEl>
+                                          </p:spTgt>
+                                        </p:tgtEl>
+                                        <p:attrNameLst>
+                                          <p:attrName>style.visibility</p:attrName>
+                                        </p:attrNameLst>
+                                      </p:cBhvr>
+                                      <p:to>
+                                        <p:strVal val="visible"/>
+                                      </p:to>
+                                    </p:set>
+                                  </p:childTnLst>
+                                </p:cTn>
+                              </p:par>
+                            </p:childTnLst>
+                          </p:cTn>
+                        </p:par>
+                      </p:childTnLst>
+                    </p:cTn>
+                  </p:par>
+                  <p:par>
+                    <p:cTn id="21" fill="hold">
+                      <p:stCondLst>
+                        <p:cond delay="indefinite"/>
+                      </p:stCondLst>
+                      <p:childTnLst>
+                        <p:par>
+                          <p:cTn id="22" fill="hold">
+                            <p:stCondLst>
+                              <p:cond delay="0"/>
+                            </p:stCondLst>
+                            <p:childTnLst>
+                              <p:par>
+                                <p:cTn id="23" presetID="1" presetClass="entr" presetSubtype="0" fill="hold" grpId="0" nodeType="clickEffect">
+                                  <p:stCondLst>
+                                    <p:cond delay="0"/>
+                                  </p:stCondLst>
+                                  <p:childTnLst>
+                                    <p:set>
+                                      <p:cBhvr>
+                                        <p:cTn id="24" dur="1" fill="hold">
+                                          <p:stCondLst>
+                                            <p:cond delay="0"/>
+                                          </p:stCondLst>
+                                        </p:cTn>
+                                        <p:tgtEl>
+                                          <p:spTgt spid="3">
+                                            <p:txEl>
+                                              <p:pRg st="8" end="8"/>
+                                            </p:txEl>
+                                          </p:spTgt>
+                                        </p:tgtEl>
+                                        <p:attrNameLst>
+                                          <p:attrName>style.visibility</p:attrName>
+                                        </p:attrNameLst>
+                                      </p:cBhvr>
+                                      <p:to>
+                                        <p:strVal val="visible"/>
+                                      </p:to>
+                                    </p:set>
+                                  </p:childTnLst>
+                                </p:cTn>
+                              </p:par>
+                              <p:par>
+                                <p:cTn id="25" presetID="1" presetClass="entr" presetSubtype="0" fill="hold" grpId="0" nodeType="withEffect">
+                                  <p:stCondLst>
+                                    <p:cond delay="0"/>
+                                  </p:stCondLst>
+                                  <p:childTnLst>
+                                    <p:set>
+                                      <p:cBhvr>
+                                        <p:cTn id="26" dur="1" fill="hold">
+                                          <p:stCondLst>
+                                            <p:cond delay="0"/>
+                                          </p:stCondLst>
+                                        </p:cTn>
+                                        <p:tgtEl>
+                                          <p:spTgt spid="3">
+                                            <p:txEl>
+                                              <p:pRg st="9" end="9"/>
+                                            </p:txEl>
+                                          </p:spTgt>
+                                        </p:tgtEl>
+                                        <p:attrNameLst>
+                                          <p:attrName>style.visibility</p:attrName>
+                                        </p:attrNameLst>
+                                      </p:cBhvr>
+                                      <p:to>
+                                        <p:strVal val="visible"/>
+                                      </p:to>
+                                    </p:set>
+                                  </p:childTnLst>
+                                </p:cTn>
+                              </p:par>
+                            </p:childTnLst>
+                          </p:cTn>
+                        </p:par>
+                      </p:childTnLst>
+                    </p:cTn>
+                  </p:par>
+                </p:childTnLst>
+              </p:cTn>
+              <p:prevCondLst>
+                <p:cond evt="onPrev" delay="0">
+                  <p:tgtEl>
+                    <p:sldTgt/>
+                  </p:tgtEl>
+                </p:cond>
+              </p:prevCondLst>
+              <p:nextCondLst>
+                <p:cond evt="onNext" delay="0">
+                  <p:tgtEl>
+                    <p:sldTgt/>
+                  </p:tgtEl>
+                </p:cond>
+              </p:nextCondLst>
+            </p:seq>
+          </p:childTnLst>
+        </p:cTn>
+      </p:par>
+    </p:tnLst>
+    <p:bldLst>
+      <p:bldP spid="3" grpId="0" uiExpand="1" build="p"/>
+    </p:bldLst>
+  </p:timing>
 </p:sld>
 </file>
 
@@ -14054,6 +14712,13 @@
   <p:clrMapOvr>
     <a:masterClrMapping/>
   </p:clrMapOvr>
+  <p:timing>
+    <p:tnLst>
+      <p:par>
+        <p:cTn id="1" dur="indefinite" restart="never" nodeType="tmRoot"/>
+      </p:par>
+    </p:tnLst>
+  </p:timing>
 </p:sld>
 </file>
 
@@ -14676,6 +15341,13 @@
   <p:clrMapOvr>
     <a:masterClrMapping/>
   </p:clrMapOvr>
+  <p:timing>
+    <p:tnLst>
+      <p:par>
+        <p:cTn id="1" dur="indefinite" restart="never" nodeType="tmRoot"/>
+      </p:par>
+    </p:tnLst>
+  </p:timing>
 </p:sld>
 </file>
 
@@ -14847,6 +15519,13 @@
   <p:clrMapOvr>
     <a:masterClrMapping/>
   </p:clrMapOvr>
+  <p:timing>
+    <p:tnLst>
+      <p:par>
+        <p:cTn id="1" dur="indefinite" restart="never" nodeType="tmRoot"/>
+      </p:par>
+    </p:tnLst>
+  </p:timing>
 </p:sld>
 </file>
 
@@ -14956,6 +15635,137 @@
   <p:clrMapOvr>
     <a:masterClrMapping/>
   </p:clrMapOvr>
+  <p:timing>
+    <p:tnLst>
+      <p:par>
+        <p:cTn id="1" dur="indefinite" restart="never" nodeType="tmRoot">
+          <p:childTnLst>
+            <p:seq concurrent="1" nextAc="seek">
+              <p:cTn id="2" dur="indefinite" nodeType="mainSeq">
+                <p:childTnLst>
+                  <p:par>
+                    <p:cTn id="3" fill="hold">
+                      <p:stCondLst>
+                        <p:cond delay="indefinite"/>
+                      </p:stCondLst>
+                      <p:childTnLst>
+                        <p:par>
+                          <p:cTn id="4" fill="hold">
+                            <p:stCondLst>
+                              <p:cond delay="0"/>
+                            </p:stCondLst>
+                            <p:childTnLst>
+                              <p:par>
+                                <p:cTn id="5" presetID="1" presetClass="entr" presetSubtype="0" fill="hold" grpId="0" nodeType="clickEffect">
+                                  <p:stCondLst>
+                                    <p:cond delay="0"/>
+                                  </p:stCondLst>
+                                  <p:childTnLst>
+                                    <p:set>
+                                      <p:cBhvr>
+                                        <p:cTn id="6" dur="1" fill="hold">
+                                          <p:stCondLst>
+                                            <p:cond delay="0"/>
+                                          </p:stCondLst>
+                                        </p:cTn>
+                                        <p:tgtEl>
+                                          <p:spTgt spid="3">
+                                            <p:txEl>
+                                              <p:pRg st="1" end="1"/>
+                                            </p:txEl>
+                                          </p:spTgt>
+                                        </p:tgtEl>
+                                        <p:attrNameLst>
+                                          <p:attrName>style.visibility</p:attrName>
+                                        </p:attrNameLst>
+                                      </p:cBhvr>
+                                      <p:to>
+                                        <p:strVal val="visible"/>
+                                      </p:to>
+                                    </p:set>
+                                  </p:childTnLst>
+                                </p:cTn>
+                              </p:par>
+                            </p:childTnLst>
+                          </p:cTn>
+                        </p:par>
+                      </p:childTnLst>
+                    </p:cTn>
+                  </p:par>
+                  <p:par>
+                    <p:cTn id="7" fill="hold">
+                      <p:stCondLst>
+                        <p:cond delay="indefinite"/>
+                      </p:stCondLst>
+                      <p:childTnLst>
+                        <p:par>
+                          <p:cTn id="8" fill="hold">
+                            <p:stCondLst>
+                              <p:cond delay="0"/>
+                            </p:stCondLst>
+                            <p:childTnLst>
+                              <p:par>
+                                <p:cTn id="9" presetID="1" presetClass="entr" presetSubtype="0" fill="hold" grpId="0" nodeType="clickEffect">
+                                  <p:stCondLst>
+                                    <p:cond delay="0"/>
+                                  </p:stCondLst>
+                                  <p:childTnLst>
+                                    <p:set>
+                                      <p:cBhvr>
+                                        <p:cTn id="10" dur="1" fill="hold">
+                                          <p:stCondLst>
+                                            <p:cond delay="0"/>
+                                          </p:stCondLst>
+                                        </p:cTn>
+                                        <p:tgtEl>
+                                          <p:spTgt spid="3">
+                                            <p:txEl>
+                                              <p:pRg st="2" end="2"/>
+                                            </p:txEl>
+                                          </p:spTgt>
+                                        </p:tgtEl>
+                                        <p:attrNameLst>
+                                          <p:attrName>style.visibility</p:attrName>
+                                        </p:attrNameLst>
+                                      </p:cBhvr>
+                                      <p:to>
+                                        <p:strVal val="visible"/>
+                                      </p:to>
+                                    </p:set>
+                                  </p:childTnLst>
+                                </p:cTn>
+                              </p:par>
+                            </p:childTnLst>
+                          </p:cTn>
+                        </p:par>
+                      </p:childTnLst>
+                    </p:cTn>
+                  </p:par>
+                </p:childTnLst>
+              </p:cTn>
+              <p:prevCondLst>
+                <p:cond evt="onPrev" delay="0">
+                  <p:tgtEl>
+                    <p:sldTgt/>
+                  </p:tgtEl>
+                </p:cond>
+              </p:prevCondLst>
+              <p:nextCondLst>
+                <p:cond evt="onNext" delay="0">
+                  <p:tgtEl>
+                    <p:sldTgt/>
+                  </p:tgtEl>
+                </p:cond>
+              </p:nextCondLst>
+            </p:seq>
+          </p:childTnLst>
+        </p:cTn>
+      </p:par>
+    </p:tnLst>
+    <p:bldLst>
+      <p:bldP spid="3" grpId="0" uiExpand="1" build="p"/>
+    </p:bldLst>
+  </p:timing>
 </p:sld>
 </file>
 
@@ -15092,6 +15902,13 @@
   <p:clrMapOvr>
     <a:masterClrMapping/>
   </p:clrMapOvr>
+  <p:timing>
+    <p:tnLst>
+      <p:par>
+        <p:cTn id="1" dur="indefinite" restart="never" nodeType="tmRoot"/>
+      </p:par>
+    </p:tnLst>
+  </p:timing>
 </p:sld>
 </file>
 
@@ -15192,6 +16009,13 @@
   <p:clrMapOvr>
     <a:masterClrMapping/>
   </p:clrMapOvr>
+  <p:timing>
+    <p:tnLst>
+      <p:par>
+        <p:cTn id="1" dur="indefinite" restart="never" nodeType="tmRoot"/>
+      </p:par>
+    </p:tnLst>
+  </p:timing>
 </p:sld>
 </file>
 
@@ -15297,6 +16121,13 @@
   <p:clrMapOvr>
     <a:masterClrMapping/>
   </p:clrMapOvr>
+  <p:timing>
+    <p:tnLst>
+      <p:par>
+        <p:cTn id="1" dur="indefinite" restart="never" nodeType="tmRoot"/>
+      </p:par>
+    </p:tnLst>
+  </p:timing>
 </p:sld>
 </file>
 

</xml_diff>